<commit_message>
Alteração no Power BI e PowerPoint
</commit_message>
<xml_diff>
--- a/DOJO - PowerBI.pptx
+++ b/DOJO - PowerBI.pptx
@@ -7,9 +7,10 @@
   <p:sldIdLst>
     <p:sldId id="256" r:id="rId2"/>
     <p:sldId id="257" r:id="rId3"/>
-    <p:sldId id="271" r:id="rId4"/>
-    <p:sldId id="270" r:id="rId5"/>
-    <p:sldId id="279" r:id="rId6"/>
+    <p:sldId id="280" r:id="rId4"/>
+    <p:sldId id="271" r:id="rId5"/>
+    <p:sldId id="270" r:id="rId6"/>
+    <p:sldId id="279" r:id="rId7"/>
   </p:sldIdLst>
   <p:sldSz cx="12192000" cy="6858000"/>
   <p:notesSz cx="6858000" cy="9144000"/>
@@ -305,7 +306,7 @@
             <a:fld id="{B61BEF0D-F0BB-DE4B-95CE-6DB70DBA9567}" type="datetimeFigureOut">
               <a:rPr lang="en-US" dirty="0"/>
               <a:pPr/>
-              <a:t>7/2/2019</a:t>
+              <a:t>7/5/2019</a:t>
             </a:fld>
             <a:endParaRPr lang="en-US" dirty="0"/>
           </a:p>
@@ -640,7 +641,7 @@
             <a:fld id="{B61BEF0D-F0BB-DE4B-95CE-6DB70DBA9567}" type="datetimeFigureOut">
               <a:rPr lang="en-US" dirty="0"/>
               <a:pPr/>
-              <a:t>7/2/2019</a:t>
+              <a:t>7/5/2019</a:t>
             </a:fld>
             <a:endParaRPr lang="en-US" dirty="0"/>
           </a:p>
@@ -1038,7 +1039,7 @@
             <a:fld id="{B61BEF0D-F0BB-DE4B-95CE-6DB70DBA9567}" type="datetimeFigureOut">
               <a:rPr lang="en-US" dirty="0"/>
               <a:pPr/>
-              <a:t>7/2/2019</a:t>
+              <a:t>7/5/2019</a:t>
             </a:fld>
             <a:endParaRPr lang="en-US" dirty="0"/>
           </a:p>
@@ -1371,7 +1372,7 @@
             <a:fld id="{B61BEF0D-F0BB-DE4B-95CE-6DB70DBA9567}" type="datetimeFigureOut">
               <a:rPr lang="en-US" dirty="0"/>
               <a:pPr/>
-              <a:t>7/2/2019</a:t>
+              <a:t>7/5/2019</a:t>
             </a:fld>
             <a:endParaRPr lang="en-US" dirty="0"/>
           </a:p>
@@ -1688,7 +1689,7 @@
             <a:fld id="{B61BEF0D-F0BB-DE4B-95CE-6DB70DBA9567}" type="datetimeFigureOut">
               <a:rPr lang="en-US" dirty="0"/>
               <a:pPr/>
-              <a:t>7/2/2019</a:t>
+              <a:t>7/5/2019</a:t>
             </a:fld>
             <a:endParaRPr lang="en-US" dirty="0"/>
           </a:p>
@@ -2081,7 +2082,7 @@
             <a:fld id="{B61BEF0D-F0BB-DE4B-95CE-6DB70DBA9567}" type="datetimeFigureOut">
               <a:rPr lang="en-US" dirty="0"/>
               <a:pPr/>
-              <a:t>7/2/2019</a:t>
+              <a:t>7/5/2019</a:t>
             </a:fld>
             <a:endParaRPr lang="en-US" dirty="0"/>
           </a:p>
@@ -2335,7 +2336,7 @@
             <a:fld id="{B61BEF0D-F0BB-DE4B-95CE-6DB70DBA9567}" type="datetimeFigureOut">
               <a:rPr lang="en-US" dirty="0"/>
               <a:pPr/>
-              <a:t>7/2/2019</a:t>
+              <a:t>7/5/2019</a:t>
             </a:fld>
             <a:endParaRPr lang="en-US" dirty="0"/>
           </a:p>
@@ -2594,7 +2595,7 @@
             <a:fld id="{B61BEF0D-F0BB-DE4B-95CE-6DB70DBA9567}" type="datetimeFigureOut">
               <a:rPr lang="en-US" dirty="0"/>
               <a:pPr/>
-              <a:t>7/2/2019</a:t>
+              <a:t>7/5/2019</a:t>
             </a:fld>
             <a:endParaRPr lang="en-US" dirty="0"/>
           </a:p>
@@ -2853,7 +2854,7 @@
             <a:fld id="{B61BEF0D-F0BB-DE4B-95CE-6DB70DBA9567}" type="datetimeFigureOut">
               <a:rPr lang="en-US" dirty="0"/>
               <a:pPr/>
-              <a:t>7/2/2019</a:t>
+              <a:t>7/5/2019</a:t>
             </a:fld>
             <a:endParaRPr lang="en-US" dirty="0"/>
           </a:p>
@@ -3179,7 +3180,7 @@
             <a:fld id="{B61BEF0D-F0BB-DE4B-95CE-6DB70DBA9567}" type="datetimeFigureOut">
               <a:rPr lang="en-US" dirty="0"/>
               <a:pPr/>
-              <a:t>7/2/2019</a:t>
+              <a:t>7/5/2019</a:t>
             </a:fld>
             <a:endParaRPr lang="en-US" dirty="0"/>
           </a:p>
@@ -3499,7 +3500,7 @@
             <a:fld id="{B61BEF0D-F0BB-DE4B-95CE-6DB70DBA9567}" type="datetimeFigureOut">
               <a:rPr lang="en-US" dirty="0"/>
               <a:pPr/>
-              <a:t>7/2/2019</a:t>
+              <a:t>7/5/2019</a:t>
             </a:fld>
             <a:endParaRPr lang="en-US" dirty="0"/>
           </a:p>
@@ -3953,7 +3954,7 @@
             <a:fld id="{B61BEF0D-F0BB-DE4B-95CE-6DB70DBA9567}" type="datetimeFigureOut">
               <a:rPr lang="en-US" dirty="0"/>
               <a:pPr/>
-              <a:t>7/2/2019</a:t>
+              <a:t>7/5/2019</a:t>
             </a:fld>
             <a:endParaRPr lang="en-US" dirty="0"/>
           </a:p>
@@ -4155,7 +4156,7 @@
             <a:fld id="{B61BEF0D-F0BB-DE4B-95CE-6DB70DBA9567}" type="datetimeFigureOut">
               <a:rPr lang="en-US" dirty="0"/>
               <a:pPr/>
-              <a:t>7/2/2019</a:t>
+              <a:t>7/5/2019</a:t>
             </a:fld>
             <a:endParaRPr lang="en-US" dirty="0"/>
           </a:p>
@@ -4329,7 +4330,7 @@
             <a:fld id="{B61BEF0D-F0BB-DE4B-95CE-6DB70DBA9567}" type="datetimeFigureOut">
               <a:rPr lang="en-US" dirty="0"/>
               <a:pPr/>
-              <a:t>7/2/2019</a:t>
+              <a:t>7/5/2019</a:t>
             </a:fld>
             <a:endParaRPr lang="en-US" dirty="0"/>
           </a:p>
@@ -4659,7 +4660,7 @@
             <a:fld id="{B61BEF0D-F0BB-DE4B-95CE-6DB70DBA9567}" type="datetimeFigureOut">
               <a:rPr lang="en-US" dirty="0"/>
               <a:pPr/>
-              <a:t>7/2/2019</a:t>
+              <a:t>7/5/2019</a:t>
             </a:fld>
             <a:endParaRPr lang="en-US" dirty="0"/>
           </a:p>
@@ -5001,7 +5002,7 @@
             <a:fld id="{B61BEF0D-F0BB-DE4B-95CE-6DB70DBA9567}" type="datetimeFigureOut">
               <a:rPr lang="en-US" dirty="0"/>
               <a:pPr/>
-              <a:t>7/2/2019</a:t>
+              <a:t>7/5/2019</a:t>
             </a:fld>
             <a:endParaRPr lang="en-US" dirty="0"/>
           </a:p>
@@ -7115,7 +7116,7 @@
             <a:fld id="{B61BEF0D-F0BB-DE4B-95CE-6DB70DBA9567}" type="datetimeFigureOut">
               <a:rPr lang="en-US" dirty="0"/>
               <a:pPr/>
-              <a:t>7/2/2019</a:t>
+              <a:t>7/5/2019</a:t>
             </a:fld>
             <a:endParaRPr lang="en-US" dirty="0"/>
           </a:p>
@@ -8341,6 +8342,171 @@
 <file path=ppt/slides/slide3.xml><?xml version="1.0" encoding="utf-8"?>
 <p:sld xmlns:a="http://schemas.openxmlformats.org/drawingml/2006/main" xmlns:r="http://schemas.openxmlformats.org/officeDocument/2006/relationships" xmlns:p="http://schemas.openxmlformats.org/presentationml/2006/main">
   <p:cSld>
+    <p:spTree>
+      <p:nvGrpSpPr>
+        <p:cNvPr id="1" name=""/>
+        <p:cNvGrpSpPr/>
+        <p:nvPr/>
+      </p:nvGrpSpPr>
+      <p:grpSpPr>
+        <a:xfrm>
+          <a:off x="0" y="0"/>
+          <a:ext cx="0" cy="0"/>
+          <a:chOff x="0" y="0"/>
+          <a:chExt cx="0" cy="0"/>
+        </a:xfrm>
+      </p:grpSpPr>
+      <p:sp>
+        <p:nvSpPr>
+          <p:cNvPr id="2" name="Título 1">
+            <a:extLst>
+              <a:ext uri="{FF2B5EF4-FFF2-40B4-BE49-F238E27FC236}">
+                <a16:creationId xmlns:a16="http://schemas.microsoft.com/office/drawing/2014/main" id="{E2F7EFBC-AE91-47C2-AA2B-47B116DFC117}"/>
+              </a:ext>
+            </a:extLst>
+          </p:cNvPr>
+          <p:cNvSpPr>
+            <a:spLocks noGrp="1"/>
+          </p:cNvSpPr>
+          <p:nvPr>
+            <p:ph type="title"/>
+          </p:nvPr>
+        </p:nvSpPr>
+        <p:spPr/>
+        <p:txBody>
+          <a:bodyPr/>
+          <a:lstStyle/>
+          <a:p>
+            <a:r>
+              <a:rPr lang="pt-BR" dirty="0"/>
+              <a:t>Qualidade dos Dados</a:t>
+            </a:r>
+          </a:p>
+        </p:txBody>
+      </p:sp>
+      <p:sp>
+        <p:nvSpPr>
+          <p:cNvPr id="3" name="Espaço Reservado para Conteúdo 2">
+            <a:extLst>
+              <a:ext uri="{FF2B5EF4-FFF2-40B4-BE49-F238E27FC236}">
+                <a16:creationId xmlns:a16="http://schemas.microsoft.com/office/drawing/2014/main" id="{A8963B84-47FA-4080-B058-0F3B74A48DBC}"/>
+              </a:ext>
+            </a:extLst>
+          </p:cNvPr>
+          <p:cNvSpPr>
+            <a:spLocks noGrp="1"/>
+          </p:cNvSpPr>
+          <p:nvPr>
+            <p:ph idx="1"/>
+          </p:nvPr>
+        </p:nvSpPr>
+        <p:spPr>
+          <a:xfrm>
+            <a:off x="2589212" y="2133600"/>
+            <a:ext cx="8915400" cy="4100290"/>
+          </a:xfrm>
+        </p:spPr>
+        <p:txBody>
+          <a:bodyPr>
+            <a:normAutofit/>
+          </a:bodyPr>
+          <a:lstStyle/>
+          <a:p>
+            <a:r>
+              <a:rPr lang="pt-BR" dirty="0"/>
+              <a:t>Importância da qualidade dos dados antes da criação dos Dashboards</a:t>
+            </a:r>
+          </a:p>
+          <a:p>
+            <a:endParaRPr lang="pt-BR" dirty="0"/>
+          </a:p>
+          <a:p>
+            <a:r>
+              <a:rPr lang="pt-BR" dirty="0"/>
+              <a:t>Má qualidade dos dados:</a:t>
+            </a:r>
+          </a:p>
+          <a:p>
+            <a:pPr lvl="1"/>
+            <a:r>
+              <a:rPr lang="pt-BR" dirty="0"/>
+              <a:t>Gráficos com visões que não refletem o real </a:t>
+            </a:r>
+          </a:p>
+          <a:p>
+            <a:pPr lvl="1"/>
+            <a:r>
+              <a:rPr lang="pt-BR" dirty="0"/>
+              <a:t>Erros na tomada de decisão</a:t>
+            </a:r>
+          </a:p>
+          <a:p>
+            <a:endParaRPr lang="pt-BR" dirty="0"/>
+          </a:p>
+          <a:p>
+            <a:r>
+              <a:rPr lang="pt-BR" dirty="0"/>
+              <a:t>Ciclo dos Dados</a:t>
+            </a:r>
+          </a:p>
+          <a:p>
+            <a:pPr lvl="1"/>
+            <a:r>
+              <a:rPr lang="pt-BR" dirty="0"/>
+              <a:t>+ utilização dos Dashboards – Gera maior numero de erros/inconsistências</a:t>
+            </a:r>
+          </a:p>
+          <a:p>
+            <a:pPr lvl="1"/>
+            <a:r>
+              <a:rPr lang="pt-BR" dirty="0"/>
+              <a:t>+ correção dos erros/inconsistências nos dados</a:t>
+            </a:r>
+          </a:p>
+          <a:p>
+            <a:pPr lvl="1"/>
+            <a:r>
+              <a:rPr lang="pt-BR" dirty="0"/>
+              <a:t>+ qualidade nos dados   </a:t>
+            </a:r>
+            <a:br>
+              <a:rPr lang="pt-BR" dirty="0"/>
+            </a:br>
+            <a:endParaRPr lang="pt-BR" dirty="0"/>
+          </a:p>
+          <a:p>
+            <a:pPr marL="457200" lvl="1" indent="0">
+              <a:buNone/>
+            </a:pPr>
+            <a:endParaRPr lang="pt-BR" dirty="0"/>
+          </a:p>
+          <a:p>
+            <a:pPr marL="0" indent="0">
+              <a:buNone/>
+            </a:pPr>
+            <a:endParaRPr lang="pt-BR" dirty="0"/>
+          </a:p>
+          <a:p>
+            <a:endParaRPr lang="pt-BR" dirty="0"/>
+          </a:p>
+        </p:txBody>
+      </p:sp>
+    </p:spTree>
+    <p:extLst>
+      <p:ext uri="{BB962C8B-B14F-4D97-AF65-F5344CB8AC3E}">
+        <p14:creationId xmlns:p14="http://schemas.microsoft.com/office/powerpoint/2010/main" val="3629142040"/>
+      </p:ext>
+    </p:extLst>
+  </p:cSld>
+  <p:clrMapOvr>
+    <a:masterClrMapping/>
+  </p:clrMapOvr>
+</p:sld>
+</file>
+
+<file path=ppt/slides/slide4.xml><?xml version="1.0" encoding="utf-8"?>
+<p:sld xmlns:a="http://schemas.openxmlformats.org/drawingml/2006/main" xmlns:r="http://schemas.openxmlformats.org/officeDocument/2006/relationships" xmlns:p="http://schemas.openxmlformats.org/presentationml/2006/main">
+  <p:cSld>
     <p:bg>
       <p:bgPr>
         <a:gradFill rotWithShape="1">
@@ -8871,7 +9037,7 @@
 </p:sld>
 </file>
 
-<file path=ppt/slides/slide4.xml><?xml version="1.0" encoding="utf-8"?>
+<file path=ppt/slides/slide5.xml><?xml version="1.0" encoding="utf-8"?>
 <p:sld xmlns:a="http://schemas.openxmlformats.org/drawingml/2006/main" xmlns:r="http://schemas.openxmlformats.org/officeDocument/2006/relationships" xmlns:p="http://schemas.openxmlformats.org/presentationml/2006/main">
   <p:cSld>
     <p:spTree>
@@ -9004,7 +9170,7 @@
 </p:sld>
 </file>
 
-<file path=ppt/slides/slide5.xml><?xml version="1.0" encoding="utf-8"?>
+<file path=ppt/slides/slide6.xml><?xml version="1.0" encoding="utf-8"?>
 <p:sld xmlns:a="http://schemas.openxmlformats.org/drawingml/2006/main" xmlns:r="http://schemas.openxmlformats.org/officeDocument/2006/relationships" xmlns:p="http://schemas.openxmlformats.org/presentationml/2006/main">
   <p:cSld>
     <p:spTree>

</xml_diff>